<commit_message>
core_electromagnet.ino update + documentation
-core_electromagnet.ino now works
-every section from subsystem_main now has electrical connection descriptions
-Notes for Scouts PowerPoint updated; better diagrams, pin descriptions, and more general info added to help new robot users understand robotics concepts
</commit_message>
<xml_diff>
--- a/Notes for scouts_2017 06 12.pptx
+++ b/Notes for scouts_2017 06 12.pptx
@@ -5,7 +5,7 @@
     <p:sldMasterId id="2147483776" r:id="rId1"/>
   </p:sldMasterIdLst>
   <p:notesMasterIdLst>
-    <p:notesMasterId r:id="rId11"/>
+    <p:notesMasterId r:id="rId13"/>
   </p:notesMasterIdLst>
   <p:sldIdLst>
     <p:sldId id="256" r:id="rId2"/>
@@ -17,30 +17,32 @@
     <p:sldId id="262" r:id="rId8"/>
     <p:sldId id="265" r:id="rId9"/>
     <p:sldId id="264" r:id="rId10"/>
+    <p:sldId id="266" r:id="rId11"/>
+    <p:sldId id="267" r:id="rId12"/>
   </p:sldIdLst>
   <p:sldSz cx="12192000" cy="6858000"/>
   <p:notesSz cx="6858000" cy="9144000"/>
   <p:embeddedFontLst>
     <p:embeddedFont>
       <p:font typeface="Lato" panose="020B0604020202020204" charset="0"/>
-      <p:regular r:id="rId12"/>
-      <p:bold r:id="rId13"/>
-      <p:italic r:id="rId14"/>
-      <p:boldItalic r:id="rId15"/>
+      <p:regular r:id="rId14"/>
+      <p:bold r:id="rId15"/>
+      <p:italic r:id="rId16"/>
+      <p:boldItalic r:id="rId17"/>
     </p:embeddedFont>
     <p:embeddedFont>
       <p:font typeface="Corbel" panose="020B0503020204020204" pitchFamily="34" charset="0"/>
-      <p:regular r:id="rId16"/>
-      <p:bold r:id="rId17"/>
-      <p:italic r:id="rId18"/>
-      <p:boldItalic r:id="rId19"/>
+      <p:regular r:id="rId18"/>
+      <p:bold r:id="rId19"/>
+      <p:italic r:id="rId20"/>
+      <p:boldItalic r:id="rId21"/>
     </p:embeddedFont>
     <p:embeddedFont>
       <p:font typeface="Calibri" panose="020F0502020204030204" pitchFamily="34" charset="0"/>
-      <p:regular r:id="rId20"/>
-      <p:bold r:id="rId21"/>
-      <p:italic r:id="rId22"/>
-      <p:boldItalic r:id="rId23"/>
+      <p:regular r:id="rId22"/>
+      <p:bold r:id="rId23"/>
+      <p:italic r:id="rId24"/>
+      <p:boldItalic r:id="rId25"/>
     </p:embeddedFont>
   </p:embeddedFontLst>
   <p:defaultTextStyle>
@@ -144,6 +146,10 @@
     </p:ext>
   </p:extLst>
 </p:presentation>
+</file>
+
+<file path=ppt/revisionInfo.xml><?xml version="1.0" encoding="utf-8"?>
+<p1510:revInfo xmlns:a="http://schemas.openxmlformats.org/drawingml/2006/main" xmlns:r="http://schemas.openxmlformats.org/officeDocument/2006/relationships" xmlns:p1510="http://schemas.microsoft.com/office/powerpoint/2015/10/main"/>
 </file>
 
 <file path=ppt/notesMasters/notesMaster1.xml><?xml version="1.0" encoding="utf-8"?>
@@ -1222,7 +1228,7 @@
           <a:p>
             <a:fld id="{1EB0A506-A1FE-44EA-B648-726E08F0C9FA}" type="datetimeFigureOut">
               <a:rPr lang="en-US" smtClean="0"/>
-              <a:t>6/12/2017</a:t>
+              <a:t>6/13/2017</a:t>
             </a:fld>
             <a:endParaRPr lang="en-US"/>
           </a:p>
@@ -1471,7 +1477,7 @@
           <a:p>
             <a:fld id="{1EB0A506-A1FE-44EA-B648-726E08F0C9FA}" type="datetimeFigureOut">
               <a:rPr lang="en-US" smtClean="0"/>
-              <a:t>6/12/2017</a:t>
+              <a:t>6/13/2017</a:t>
             </a:fld>
             <a:endParaRPr lang="en-US"/>
           </a:p>
@@ -1674,7 +1680,7 @@
           <a:p>
             <a:fld id="{1EB0A506-A1FE-44EA-B648-726E08F0C9FA}" type="datetimeFigureOut">
               <a:rPr lang="en-US" smtClean="0"/>
-              <a:t>6/12/2017</a:t>
+              <a:t>6/13/2017</a:t>
             </a:fld>
             <a:endParaRPr lang="en-US"/>
           </a:p>
@@ -2375,7 +2381,7 @@
           <a:p>
             <a:fld id="{1EB0A506-A1FE-44EA-B648-726E08F0C9FA}" type="datetimeFigureOut">
               <a:rPr lang="en-US" smtClean="0"/>
-              <a:t>6/12/2017</a:t>
+              <a:t>6/13/2017</a:t>
             </a:fld>
             <a:endParaRPr lang="en-US"/>
           </a:p>
@@ -2726,7 +2732,7 @@
           <a:p>
             <a:fld id="{1EB0A506-A1FE-44EA-B648-726E08F0C9FA}" type="datetimeFigureOut">
               <a:rPr lang="en-US" smtClean="0"/>
-              <a:t>6/12/2017</a:t>
+              <a:t>6/13/2017</a:t>
             </a:fld>
             <a:endParaRPr lang="en-US"/>
           </a:p>
@@ -3173,7 +3179,7 @@
           <a:p>
             <a:fld id="{1EB0A506-A1FE-44EA-B648-726E08F0C9FA}" type="datetimeFigureOut">
               <a:rPr lang="en-US" smtClean="0"/>
-              <a:t>6/12/2017</a:t>
+              <a:t>6/13/2017</a:t>
             </a:fld>
             <a:endParaRPr lang="en-US"/>
           </a:p>
@@ -3314,7 +3320,7 @@
           <a:p>
             <a:fld id="{1EB0A506-A1FE-44EA-B648-726E08F0C9FA}" type="datetimeFigureOut">
               <a:rPr lang="en-US" smtClean="0"/>
-              <a:t>6/12/2017</a:t>
+              <a:t>6/13/2017</a:t>
             </a:fld>
             <a:endParaRPr lang="en-US"/>
           </a:p>
@@ -3432,7 +3438,7 @@
           <a:p>
             <a:fld id="{1EB0A506-A1FE-44EA-B648-726E08F0C9FA}" type="datetimeFigureOut">
               <a:rPr lang="en-US" smtClean="0"/>
-              <a:t>6/12/2017</a:t>
+              <a:t>6/13/2017</a:t>
             </a:fld>
             <a:endParaRPr lang="en-US"/>
           </a:p>
@@ -3728,7 +3734,7 @@
           <a:p>
             <a:fld id="{1EB0A506-A1FE-44EA-B648-726E08F0C9FA}" type="datetimeFigureOut">
               <a:rPr lang="en-US" smtClean="0"/>
-              <a:t>6/12/2017</a:t>
+              <a:t>6/13/2017</a:t>
             </a:fld>
             <a:endParaRPr lang="en-US"/>
           </a:p>
@@ -4023,7 +4029,7 @@
           <a:p>
             <a:fld id="{1EB0A506-A1FE-44EA-B648-726E08F0C9FA}" type="datetimeFigureOut">
               <a:rPr lang="en-US" smtClean="0"/>
-              <a:t>6/12/2017</a:t>
+              <a:t>6/13/2017</a:t>
             </a:fld>
             <a:endParaRPr lang="en-US"/>
           </a:p>
@@ -4299,7 +4305,7 @@
           <a:p>
             <a:fld id="{1EB0A506-A1FE-44EA-B648-726E08F0C9FA}" type="datetimeFigureOut">
               <a:rPr lang="en-US" smtClean="0"/>
-              <a:t>6/12/2017</a:t>
+              <a:t>6/13/2017</a:t>
             </a:fld>
             <a:endParaRPr lang="en-US"/>
           </a:p>
@@ -4880,6 +4886,34 @@
               <a:buNone/>
             </a:pPr>
             <a:r>
+              <a:rPr lang="en-US" sz="2400" dirty="0">
+                <a:solidFill>
+                  <a:schemeClr val="dk1"/>
+                </a:solidFill>
+                <a:latin typeface="Calibri"/>
+                <a:ea typeface="Calibri"/>
+                <a:cs typeface="Calibri"/>
+                <a:sym typeface="Calibri"/>
+              </a:rPr>
+              <a:t>Kevin Nufer</a:t>
+            </a:r>
+          </a:p>
+          <a:p>
+            <a:pPr marL="0" marR="0" lvl="0" indent="0" algn="ctr" rtl="0">
+              <a:lnSpc>
+                <a:spcPct val="90000"/>
+              </a:lnSpc>
+              <a:spcBef>
+                <a:spcPts val="0"/>
+              </a:spcBef>
+              <a:buClr>
+                <a:schemeClr val="dk1"/>
+              </a:buClr>
+              <a:buSzPct val="25000"/>
+              <a:buFont typeface="Arial"/>
+              <a:buNone/>
+            </a:pPr>
+            <a:r>
               <a:rPr lang="en-US" sz="2400">
                 <a:solidFill>
                   <a:schemeClr val="dk1"/>
@@ -4889,40 +4923,341 @@
                 <a:cs typeface="Calibri"/>
                 <a:sym typeface="Calibri"/>
               </a:rPr>
-              <a:t>Kevin Nufer</a:t>
-            </a:r>
-          </a:p>
-          <a:p>
-            <a:pPr marL="0" marR="0" lvl="0" indent="0" algn="ctr" rtl="0">
-              <a:lnSpc>
-                <a:spcPct val="90000"/>
-              </a:lnSpc>
-              <a:spcBef>
-                <a:spcPts val="0"/>
-              </a:spcBef>
-              <a:buClr>
+              <a:t>14 Jun 2017</a:t>
+            </a:r>
+            <a:endParaRPr lang="en-US" sz="2400" dirty="0">
+              <a:solidFill>
                 <a:schemeClr val="dk1"/>
-              </a:buClr>
-              <a:buSzPct val="25000"/>
-              <a:buFont typeface="Arial"/>
+              </a:solidFill>
+              <a:latin typeface="Calibri"/>
+              <a:ea typeface="Calibri"/>
+              <a:cs typeface="Calibri"/>
+              <a:sym typeface="Calibri"/>
+            </a:endParaRPr>
+          </a:p>
+        </p:txBody>
+      </p:sp>
+    </p:spTree>
+  </p:cSld>
+  <p:clrMapOvr>
+    <a:masterClrMapping/>
+  </p:clrMapOvr>
+</p:sld>
+</file>
+
+<file path=ppt/slides/slide10.xml><?xml version="1.0" encoding="utf-8"?>
+<p:sld xmlns:a="http://schemas.openxmlformats.org/drawingml/2006/main" xmlns:r="http://schemas.openxmlformats.org/officeDocument/2006/relationships" xmlns:p="http://schemas.openxmlformats.org/presentationml/2006/main">
+  <p:cSld>
+    <p:spTree>
+      <p:nvGrpSpPr>
+        <p:cNvPr id="1" name=""/>
+        <p:cNvGrpSpPr/>
+        <p:nvPr/>
+      </p:nvGrpSpPr>
+      <p:grpSpPr>
+        <a:xfrm>
+          <a:off x="0" y="0"/>
+          <a:ext cx="0" cy="0"/>
+          <a:chOff x="0" y="0"/>
+          <a:chExt cx="0" cy="0"/>
+        </a:xfrm>
+      </p:grpSpPr>
+      <p:sp>
+        <p:nvSpPr>
+          <p:cNvPr id="2" name="Title 1">
+            <a:extLst>
+              <a:ext uri="{FF2B5EF4-FFF2-40B4-BE49-F238E27FC236}">
+                <a16:creationId xmlns:a16="http://schemas.microsoft.com/office/drawing/2014/main" id="{16D5B071-2477-4D61-BD0D-D324A7EAE6B3}"/>
+              </a:ext>
+            </a:extLst>
+          </p:cNvPr>
+          <p:cNvSpPr>
+            <a:spLocks noGrp="1"/>
+          </p:cNvSpPr>
+          <p:nvPr>
+            <p:ph type="title"/>
+          </p:nvPr>
+        </p:nvSpPr>
+        <p:spPr/>
+        <p:txBody>
+          <a:bodyPr/>
+          <a:lstStyle/>
+          <a:p>
+            <a:r>
+              <a:rPr lang="en-US" dirty="0"/>
+              <a:t>Intro to Pulse Width Modulation (PWM)</a:t>
+            </a:r>
+          </a:p>
+        </p:txBody>
+      </p:sp>
+      <p:sp>
+        <p:nvSpPr>
+          <p:cNvPr id="3" name="Text Placeholder 2">
+            <a:extLst>
+              <a:ext uri="{FF2B5EF4-FFF2-40B4-BE49-F238E27FC236}">
+                <a16:creationId xmlns:a16="http://schemas.microsoft.com/office/drawing/2014/main" id="{3C11C913-C7D2-4F14-867D-D43AC532F26B}"/>
+              </a:ext>
+            </a:extLst>
+          </p:cNvPr>
+          <p:cNvSpPr>
+            <a:spLocks noGrp="1"/>
+          </p:cNvSpPr>
+          <p:nvPr>
+            <p:ph type="body" idx="1"/>
+          </p:nvPr>
+        </p:nvSpPr>
+        <p:spPr/>
+        <p:txBody>
+          <a:bodyPr/>
+          <a:lstStyle/>
+          <a:p>
+            <a:r>
+              <a:rPr lang="en-US" dirty="0"/>
+              <a:t>(explanation of PWM)</a:t>
+            </a:r>
+          </a:p>
+        </p:txBody>
+      </p:sp>
+    </p:spTree>
+    <p:extLst>
+      <p:ext uri="{BB962C8B-B14F-4D97-AF65-F5344CB8AC3E}">
+        <p14:creationId xmlns:p14="http://schemas.microsoft.com/office/powerpoint/2010/main" val="4110120534"/>
+      </p:ext>
+    </p:extLst>
+  </p:cSld>
+  <p:clrMapOvr>
+    <a:masterClrMapping/>
+  </p:clrMapOvr>
+</p:sld>
+</file>
+
+<file path=ppt/slides/slide11.xml><?xml version="1.0" encoding="utf-8"?>
+<p:sld xmlns:a="http://schemas.openxmlformats.org/drawingml/2006/main" xmlns:r="http://schemas.openxmlformats.org/officeDocument/2006/relationships" xmlns:p="http://schemas.openxmlformats.org/presentationml/2006/main">
+  <p:cSld>
+    <p:spTree>
+      <p:nvGrpSpPr>
+        <p:cNvPr id="1" name=""/>
+        <p:cNvGrpSpPr/>
+        <p:nvPr/>
+      </p:nvGrpSpPr>
+      <p:grpSpPr>
+        <a:xfrm>
+          <a:off x="0" y="0"/>
+          <a:ext cx="0" cy="0"/>
+          <a:chOff x="0" y="0"/>
+          <a:chExt cx="0" cy="0"/>
+        </a:xfrm>
+      </p:grpSpPr>
+      <p:sp>
+        <p:nvSpPr>
+          <p:cNvPr id="2" name="Title 1">
+            <a:extLst>
+              <a:ext uri="{FF2B5EF4-FFF2-40B4-BE49-F238E27FC236}">
+                <a16:creationId xmlns:a16="http://schemas.microsoft.com/office/drawing/2014/main" id="{4A4A1D95-ECDF-49EA-BF6B-A26DB304391A}"/>
+              </a:ext>
+            </a:extLst>
+          </p:cNvPr>
+          <p:cNvSpPr>
+            <a:spLocks noGrp="1"/>
+          </p:cNvSpPr>
+          <p:nvPr>
+            <p:ph type="title"/>
+          </p:nvPr>
+        </p:nvSpPr>
+        <p:spPr/>
+        <p:txBody>
+          <a:bodyPr/>
+          <a:lstStyle/>
+          <a:p>
+            <a:r>
+              <a:rPr lang="en-US" dirty="0"/>
+              <a:t>Notes on Analog vs Digital Pins</a:t>
+            </a:r>
+          </a:p>
+        </p:txBody>
+      </p:sp>
+      <p:sp>
+        <p:nvSpPr>
+          <p:cNvPr id="3" name="Text Placeholder 2">
+            <a:extLst>
+              <a:ext uri="{FF2B5EF4-FFF2-40B4-BE49-F238E27FC236}">
+                <a16:creationId xmlns:a16="http://schemas.microsoft.com/office/drawing/2014/main" id="{ED9548AE-D9FE-41BA-8C58-0147436AEF96}"/>
+              </a:ext>
+            </a:extLst>
+          </p:cNvPr>
+          <p:cNvSpPr>
+            <a:spLocks noGrp="1"/>
+          </p:cNvSpPr>
+          <p:nvPr>
+            <p:ph type="body" idx="1"/>
+          </p:nvPr>
+        </p:nvSpPr>
+        <p:spPr/>
+        <p:txBody>
+          <a:bodyPr>
+            <a:normAutofit fontScale="85000" lnSpcReduction="20000"/>
+          </a:bodyPr>
+          <a:lstStyle/>
+          <a:p>
+            <a:pPr marL="45720" indent="0">
               <a:buNone/>
             </a:pPr>
             <a:r>
-              <a:rPr lang="en-US" sz="2400">
-                <a:solidFill>
-                  <a:schemeClr val="dk1"/>
-                </a:solidFill>
-                <a:latin typeface="Calibri"/>
-                <a:ea typeface="Calibri"/>
-                <a:cs typeface="Calibri"/>
-                <a:sym typeface="Calibri"/>
+              <a:rPr lang="en-US" dirty="0"/>
+              <a:t>Differences</a:t>
+            </a:r>
+          </a:p>
+          <a:p>
+            <a:r>
+              <a:rPr lang="en-US" dirty="0"/>
+              <a:t>Digital is like a light switch—it is either on or off</a:t>
+            </a:r>
+          </a:p>
+          <a:p>
+            <a:pPr lvl="1"/>
+            <a:r>
+              <a:rPr lang="en-US" dirty="0" err="1"/>
+              <a:t>digitalRead</a:t>
+            </a:r>
+            <a:r>
+              <a:rPr lang="en-US" dirty="0"/>
+              <a:t>() will either give you LOW or HIGH (or 0 and 1), depending on if it reads high or low voltages</a:t>
+            </a:r>
+          </a:p>
+          <a:p>
+            <a:pPr lvl="1"/>
+            <a:r>
+              <a:rPr lang="en-US" dirty="0" err="1"/>
+              <a:t>digitalWrite</a:t>
+            </a:r>
+            <a:r>
+              <a:rPr lang="en-US" dirty="0"/>
+              <a:t>() will set your pin to either high or low voltages</a:t>
+            </a:r>
+          </a:p>
+          <a:p>
+            <a:pPr lvl="1"/>
+            <a:r>
+              <a:rPr lang="en-US" dirty="0"/>
+              <a:t>Both </a:t>
+            </a:r>
+            <a:r>
+              <a:rPr lang="en-US" dirty="0" err="1"/>
+              <a:t>digitalRead</a:t>
+            </a:r>
+            <a:r>
+              <a:rPr lang="en-US" dirty="0"/>
+              <a:t>() and </a:t>
+            </a:r>
+            <a:r>
+              <a:rPr lang="en-US" dirty="0" err="1"/>
+              <a:t>digitalWrite</a:t>
+            </a:r>
+            <a:r>
+              <a:rPr lang="en-US" dirty="0"/>
+              <a:t>() can be used on all pins, whether that pin is analog or digital! (with exception of A6 and A7—analog input only)</a:t>
+            </a:r>
+          </a:p>
+          <a:p>
+            <a:r>
+              <a:rPr lang="en-US" dirty="0"/>
+              <a:t>Analog can read intermediate values from 0-1023, and write values from 0 – 255</a:t>
+            </a:r>
+          </a:p>
+          <a:p>
+            <a:pPr lvl="1"/>
+            <a:r>
+              <a:rPr lang="en-US" dirty="0"/>
+              <a:t>Good for reading potentiometers for example</a:t>
+            </a:r>
+          </a:p>
+          <a:p>
+            <a:pPr lvl="1"/>
+            <a:r>
+              <a:rPr lang="en-US" dirty="0"/>
+              <a:t>Digital pins that are Pulse Width Modulation (PWM)-capable can </a:t>
+            </a:r>
+            <a:r>
+              <a:rPr lang="en-US" dirty="0" err="1"/>
+              <a:t>analogWrite</a:t>
+            </a:r>
+            <a:r>
+              <a:rPr lang="en-US" dirty="0"/>
+              <a:t>(); these digital pins are 3, 5, 6, 9, 10, and 11</a:t>
+            </a:r>
+          </a:p>
+          <a:p>
+            <a:pPr lvl="1"/>
+            <a:r>
+              <a:rPr lang="en-US" dirty="0"/>
+              <a:t>Only analog pins can </a:t>
+            </a:r>
+            <a:r>
+              <a:rPr lang="en-US" dirty="0" err="1"/>
+              <a:t>analogRead</a:t>
+            </a:r>
+            <a:r>
+              <a:rPr lang="en-US" dirty="0"/>
+              <a:t>()</a:t>
+            </a:r>
+          </a:p>
+          <a:p>
+            <a:pPr lvl="1"/>
+            <a:r>
+              <a:rPr lang="en-US" dirty="0"/>
+              <a:t>Note: servos DO NOT need analog pins</a:t>
+            </a:r>
+          </a:p>
+          <a:p>
+            <a:endParaRPr lang="en-US" dirty="0"/>
+          </a:p>
+          <a:p>
+            <a:endParaRPr lang="en-US" dirty="0"/>
+          </a:p>
+          <a:p>
+            <a:endParaRPr lang="en-US" dirty="0"/>
+          </a:p>
+          <a:p>
+            <a:pPr marL="45720" indent="0">
+              <a:buNone/>
+            </a:pPr>
+            <a:r>
+              <a:rPr lang="en-US" sz="1800" dirty="0"/>
+              <a:t>Good discussions: </a:t>
+            </a:r>
+          </a:p>
+          <a:p>
+            <a:pPr marL="45720" indent="0">
+              <a:buNone/>
+            </a:pPr>
+            <a:r>
+              <a:rPr lang="en-US" sz="1800" dirty="0">
+                <a:hlinkClick r:id="rId2"/>
               </a:rPr>
-              <a:t>24 Apr 2017</a:t>
-            </a:r>
+              <a:t>https://electronics.stackexchange.com/questions/67103/can-i-use-the-analog-pins-on-the-arduino-for-my-project-as-digital</a:t>
+            </a:r>
+            <a:endParaRPr lang="en-US" sz="1800" dirty="0"/>
+          </a:p>
+          <a:p>
+            <a:pPr marL="45720" indent="0">
+              <a:buNone/>
+            </a:pPr>
+            <a:r>
+              <a:rPr lang="en-US" sz="1800" dirty="0">
+                <a:hlinkClick r:id="rId3"/>
+              </a:rPr>
+              <a:t>https://forum.arduino.cc/index.php?topic=357562.0</a:t>
+            </a:r>
+            <a:endParaRPr lang="en-US" sz="1800" dirty="0"/>
           </a:p>
         </p:txBody>
       </p:sp>
     </p:spTree>
+    <p:extLst>
+      <p:ext uri="{BB962C8B-B14F-4D97-AF65-F5344CB8AC3E}">
+        <p14:creationId xmlns:p14="http://schemas.microsoft.com/office/powerpoint/2010/main" val="1107882038"/>
+      </p:ext>
+    </p:extLst>
   </p:cSld>
   <p:clrMapOvr>
     <a:masterClrMapping/>
@@ -5815,7 +6150,7 @@
               <a:buNone/>
             </a:pPr>
             <a:r>
-              <a:rPr lang="en-US"/>
+              <a:rPr lang="en-US" dirty="0"/>
               <a:t>To the right is an electrical diagram of a subsystem with an electromagnet, servo, and stepper motor</a:t>
             </a:r>
           </a:p>
@@ -5826,7 +6161,7 @@
               </a:spcBef>
               <a:buNone/>
             </a:pPr>
-            <a:endParaRPr/>
+            <a:endParaRPr dirty="0"/>
           </a:p>
           <a:p>
             <a:pPr lvl="0">
@@ -5836,8 +6171,32 @@
               <a:buNone/>
             </a:pPr>
             <a:r>
-              <a:rPr lang="en-US"/>
-              <a:t>Not shown: the rest of the robot (the rest is tied in to the Arduino too)</a:t>
+              <a:rPr lang="en-US" dirty="0"/>
+              <a:t>Not shown: </a:t>
+            </a:r>
+          </a:p>
+          <a:p>
+            <a:pPr lvl="0">
+              <a:spcBef>
+                <a:spcPts val="0"/>
+              </a:spcBef>
+              <a:buNone/>
+            </a:pPr>
+            <a:r>
+              <a:rPr lang="en-US" dirty="0"/>
+              <a:t>-The robot car</a:t>
+            </a:r>
+          </a:p>
+          <a:p>
+            <a:pPr lvl="0">
+              <a:spcBef>
+                <a:spcPts val="0"/>
+              </a:spcBef>
+              <a:buNone/>
+            </a:pPr>
+            <a:r>
+              <a:rPr lang="en-US" dirty="0"/>
+              <a:t>-The H-bridge and servo connections to the Arduino pins</a:t>
             </a:r>
           </a:p>
         </p:txBody>
@@ -5895,6 +6254,13 @@
           <a:prstGeom prst="rect">
             <a:avLst/>
           </a:prstGeom>
+          <a:effectLst>
+            <a:outerShdw blurRad="50800" dist="38100" dir="2700000" algn="tl" rotWithShape="0">
+              <a:prstClr val="black">
+                <a:alpha val="40000"/>
+              </a:prstClr>
+            </a:outerShdw>
+          </a:effectLst>
         </p:spPr>
       </p:pic>
       <p:sp>
@@ -5911,8 +6277,8 @@
         </p:nvSpPr>
         <p:spPr>
           <a:xfrm>
-            <a:off x="10098157" y="3074504"/>
-            <a:ext cx="1537252" cy="1754326"/>
+            <a:off x="9734843" y="5459891"/>
+            <a:ext cx="2208628" cy="1169551"/>
           </a:xfrm>
           <a:prstGeom prst="rect">
             <a:avLst/>
@@ -5926,8 +6292,8 @@
           <a:lstStyle/>
           <a:p>
             <a:r>
-              <a:rPr lang="en-US" dirty="0"/>
-              <a:t>http://www.pighixxx.com/test/wp-content/uploads/2014/11/nano.png</a:t>
+              <a:rPr lang="en-US" sz="1400" dirty="0"/>
+              <a:t>Graphic source: http://www.pighixxx.com/test/wp-content/uploads/2014/11/nano.png</a:t>
             </a:r>
           </a:p>
         </p:txBody>
@@ -5946,8 +6312,8 @@
         </p:nvSpPr>
         <p:spPr>
           <a:xfrm>
-            <a:off x="10098157" y="792049"/>
-            <a:ext cx="1537252" cy="1754326"/>
+            <a:off x="9734843" y="235455"/>
+            <a:ext cx="2208628" cy="2677656"/>
           </a:xfrm>
           <a:prstGeom prst="rect">
             <a:avLst/>
@@ -5961,12 +6327,88 @@
           <a:lstStyle/>
           <a:p>
             <a:r>
-              <a:rPr lang="en-US" b="1" dirty="0">
+              <a:rPr lang="en-US" sz="1400" b="1" dirty="0">
                 <a:solidFill>
                   <a:srgbClr val="7030A0"/>
                 </a:solidFill>
               </a:rPr>
               <a:t>The purple numbers are how the Arduino IDE references them</a:t>
+            </a:r>
+          </a:p>
+          <a:p>
+            <a:endParaRPr lang="en-US" sz="1400" b="1" dirty="0">
+              <a:solidFill>
+                <a:srgbClr val="7030A0"/>
+              </a:solidFill>
+            </a:endParaRPr>
+          </a:p>
+          <a:p>
+            <a:r>
+              <a:rPr lang="en-US" sz="1400" b="1" dirty="0">
+                <a:solidFill>
+                  <a:srgbClr val="00B050"/>
+                </a:solidFill>
+              </a:rPr>
+              <a:t>The green numbers are different ways to refer to the same pin. </a:t>
+            </a:r>
+            <a:r>
+              <a:rPr lang="en-US" sz="1400" b="1" dirty="0" err="1">
+                <a:solidFill>
+                  <a:srgbClr val="00B050"/>
+                </a:solidFill>
+              </a:rPr>
+              <a:t>Sayin</a:t>
+            </a:r>
+            <a:r>
+              <a:rPr lang="en-US" sz="1400" b="1" dirty="0">
+                <a:solidFill>
+                  <a:srgbClr val="00B050"/>
+                </a:solidFill>
+              </a:rPr>
+              <a:t> pin A1 in your code (aka, Analog pin 1) is the same as saying pin 13. You can refer to that pin in your code as either one. </a:t>
+            </a:r>
+          </a:p>
+        </p:txBody>
+      </p:sp>
+      <p:sp>
+        <p:nvSpPr>
+          <p:cNvPr id="8" name="TextBox 7">
+            <a:extLst>
+              <a:ext uri="{FF2B5EF4-FFF2-40B4-BE49-F238E27FC236}">
+                <a16:creationId xmlns:a16="http://schemas.microsoft.com/office/drawing/2014/main" id="{BB130360-E29C-4F55-AD60-17AA869E5958}"/>
+              </a:ext>
+            </a:extLst>
+          </p:cNvPr>
+          <p:cNvSpPr txBox="1"/>
+          <p:nvPr/>
+        </p:nvSpPr>
+        <p:spPr>
+          <a:xfrm>
+            <a:off x="9734843" y="3001001"/>
+            <a:ext cx="2208628" cy="1384995"/>
+          </a:xfrm>
+          <a:prstGeom prst="rect">
+            <a:avLst/>
+          </a:prstGeom>
+          <a:noFill/>
+        </p:spPr>
+        <p:txBody>
+          <a:bodyPr wrap="square" rtlCol="0">
+            <a:spAutoFit/>
+          </a:bodyPr>
+          <a:lstStyle/>
+          <a:p>
+            <a:r>
+              <a:rPr lang="en-US" sz="1400" dirty="0"/>
+              <a:t>Pins D3, D5, D6, D9, D10, and D11 (3, 5, 6, 9, 10, and 11 in the Arduino IDE) are digital pins capable of PWM output using </a:t>
+            </a:r>
+            <a:r>
+              <a:rPr lang="en-US" sz="1400" dirty="0" err="1"/>
+              <a:t>AnalogWrite</a:t>
+            </a:r>
+            <a:r>
+              <a:rPr lang="en-US" sz="1400" dirty="0"/>
+              <a:t>()</a:t>
             </a:r>
           </a:p>
         </p:txBody>
@@ -6070,7 +6512,7 @@
             </a:pPr>
             <a:r>
               <a:rPr lang="en-US" sz="1800" dirty="0"/>
-              <a:t>Connect the ULN2003 driver IN1, IN2, IN3 and IN4 to digital pins D3, D4, D5 and D6 respectively on the Arduino Uno. </a:t>
+              <a:t>Connect the ULN2003 driver IN1, IN2, IN3 and IN4 to digital pins D3, D4, D5 and D6 respectively on the Arduino Nano. </a:t>
             </a:r>
           </a:p>
           <a:p>
@@ -6417,7 +6859,7 @@
         </p:blipFill>
         <p:spPr>
           <a:xfrm>
-            <a:off x="6790546" y="369404"/>
+            <a:off x="6671278" y="369404"/>
             <a:ext cx="5261477" cy="3725518"/>
           </a:xfrm>
           <a:prstGeom prst="rect">
@@ -6447,7 +6889,7 @@
         </p:blipFill>
         <p:spPr>
           <a:xfrm>
-            <a:off x="7078134" y="5196715"/>
+            <a:off x="6958866" y="5196715"/>
             <a:ext cx="4686300" cy="1076325"/>
           </a:xfrm>
           <a:prstGeom prst="rect">
@@ -6536,55 +6978,74 @@
           </a:xfrm>
         </p:spPr>
         <p:txBody>
-          <a:bodyPr/>
+          <a:bodyPr>
+            <a:normAutofit fontScale="85000" lnSpcReduction="10000"/>
+          </a:bodyPr>
           <a:lstStyle/>
           <a:p>
             <a:r>
               <a:rPr lang="en-US" dirty="0"/>
-              <a:t>(Description of how to attach the pins—electromagnet, boost converter </a:t>
+              <a:t>H-bridge used: L298N </a:t>
+            </a:r>
+          </a:p>
+          <a:p>
+            <a:r>
+              <a:rPr lang="en-US" dirty="0"/>
+              <a:t>Electrical setup:</a:t>
+            </a:r>
+          </a:p>
+          <a:p>
+            <a:pPr lvl="1"/>
+            <a:r>
+              <a:rPr lang="en-US" dirty="0"/>
+              <a:t>Supply the 12V input on the H-bridge with the wire coming off the positive output of the boost converter</a:t>
+            </a:r>
+          </a:p>
+          <a:p>
+            <a:pPr lvl="1"/>
+            <a:r>
+              <a:rPr lang="en-US" dirty="0"/>
+              <a:t>The negative terminal output wire from the boost converter should be connected to the negative terminal of the H-bridge</a:t>
+            </a:r>
+          </a:p>
+          <a:p>
+            <a:pPr lvl="1"/>
+            <a:r>
+              <a:rPr lang="en-US" dirty="0"/>
+              <a:t>One wire from the electromagnet should go to Output1 on the H-bridge</a:t>
+            </a:r>
+          </a:p>
+          <a:p>
+            <a:pPr lvl="1"/>
+            <a:r>
+              <a:rPr lang="en-US" dirty="0"/>
+              <a:t>The other wire from the electromagnet should go to ground on the H-bridge</a:t>
+            </a:r>
+          </a:p>
+          <a:p>
+            <a:pPr lvl="2"/>
+            <a:r>
+              <a:rPr lang="en-US" dirty="0"/>
+              <a:t>if the code below turns the electromagnet off when it should be on and on when it should be off, switch the wires on the electromagnet (aka, output 1 goes to ground, ground goes to output1)</a:t>
+            </a:r>
+          </a:p>
+          <a:p>
+            <a:pPr lvl="1"/>
+            <a:r>
+              <a:rPr lang="en-US" dirty="0"/>
+              <a:t>IN1 on the H-bridge should be connected to Analog Pin A0 on the Arduino Nano (or whichever Arduino Nano pin is called out for </a:t>
             </a:r>
             <a:r>
               <a:rPr lang="en-US" dirty="0" err="1"/>
-              <a:t>etc</a:t>
-            </a:r>
-            <a:r>
-              <a:rPr lang="en-US"/>
+              <a:t>HbridgeElectromagnetPin</a:t>
+            </a:r>
+            <a:r>
+              <a:rPr lang="en-US" dirty="0"/>
               <a:t>)</a:t>
             </a:r>
-            <a:endParaRPr lang="en-US" dirty="0"/>
-          </a:p>
-        </p:txBody>
-      </p:sp>
-      <p:pic>
-        <p:nvPicPr>
-          <p:cNvPr id="5" name="Picture 4">
-            <a:extLst>
-              <a:ext uri="{FF2B5EF4-FFF2-40B4-BE49-F238E27FC236}">
-                <a16:creationId xmlns:a16="http://schemas.microsoft.com/office/drawing/2014/main" id="{A7C556D6-0D02-4A02-9BBC-D9D1BD515050}"/>
-              </a:ext>
-            </a:extLst>
-          </p:cNvPr>
-          <p:cNvPicPr>
-            <a:picLocks noChangeAspect="1"/>
-          </p:cNvPicPr>
-          <p:nvPr/>
-        </p:nvPicPr>
-        <p:blipFill>
-          <a:blip r:embed="rId2"/>
-          <a:stretch>
-            <a:fillRect/>
-          </a:stretch>
-        </p:blipFill>
-        <p:spPr>
-          <a:xfrm>
-            <a:off x="8423018" y="927016"/>
-            <a:ext cx="3508606" cy="3815105"/>
-          </a:xfrm>
-          <a:prstGeom prst="rect">
-            <a:avLst/>
-          </a:prstGeom>
-        </p:spPr>
-      </p:pic>
+          </a:p>
+        </p:txBody>
+      </p:sp>
       <p:sp>
         <p:nvSpPr>
           <p:cNvPr id="6" name="TextBox 5">
@@ -6599,8 +7060,8 @@
         </p:nvSpPr>
         <p:spPr>
           <a:xfrm>
-            <a:off x="8423018" y="4742121"/>
-            <a:ext cx="2975096" cy="954107"/>
+            <a:off x="8619970" y="4886499"/>
+            <a:ext cx="2975096" cy="1815882"/>
           </a:xfrm>
           <a:prstGeom prst="rect">
             <a:avLst/>
@@ -6615,142 +7076,77 @@
           <a:p>
             <a:r>
               <a:rPr lang="en-US" sz="1400" dirty="0"/>
-              <a:t>H-bridge tutorial: </a:t>
-            </a:r>
+              <a:t>H-bridge tutorials: </a:t>
+            </a:r>
+            <a:r>
+              <a:rPr lang="en-US" sz="1400" dirty="0">
+                <a:hlinkClick r:id="rId2"/>
+              </a:rPr>
+              <a:t>https://tronixlabs.com.au/news/tutorial-l298n-dual-motor-controller-module-2a-and-arduino/</a:t>
+            </a:r>
+            <a:endParaRPr lang="en-US" sz="1400" dirty="0"/>
+          </a:p>
+          <a:p>
+            <a:endParaRPr lang="en-US" sz="1400" dirty="0"/>
+          </a:p>
+          <a:p>
             <a:r>
               <a:rPr lang="en-US" sz="1400" dirty="0">
                 <a:hlinkClick r:id="rId3"/>
               </a:rPr>
-              <a:t>https://tronixlabs.com.au/news/tutorial-l298n-dual-motor-controller-module-2a-and-arduino/</a:t>
+              <a:t>http://www.instructables.com/id/Arduino-Modules-L298N-Dual-H-Bridge-Motor-Controll/</a:t>
             </a:r>
             <a:endParaRPr lang="en-US" sz="1400" dirty="0"/>
           </a:p>
         </p:txBody>
       </p:sp>
-      <p:sp>
-        <p:nvSpPr>
-          <p:cNvPr id="7" name="TextBox 6">
+      <p:pic>
+        <p:nvPicPr>
+          <p:cNvPr id="1026" name="Picture 2" descr="Getting to Know Your L298N Dual H-Bridge Motor Controller Module:">
             <a:extLst>
               <a:ext uri="{FF2B5EF4-FFF2-40B4-BE49-F238E27FC236}">
-                <a16:creationId xmlns:a16="http://schemas.microsoft.com/office/drawing/2014/main" id="{964F3886-E4FE-40F0-AD22-DAFAE20AB883}"/>
+                <a16:creationId xmlns:a16="http://schemas.microsoft.com/office/drawing/2014/main" id="{84157E95-4D60-40C4-AF8B-725D2EB18786}"/>
               </a:ext>
             </a:extLst>
           </p:cNvPr>
-          <p:cNvSpPr txBox="1"/>
+          <p:cNvPicPr>
+            <a:picLocks noChangeAspect="1" noChangeArrowheads="1"/>
+          </p:cNvPicPr>
           <p:nvPr/>
-        </p:nvSpPr>
-        <p:spPr>
+        </p:nvPicPr>
+        <p:blipFill>
+          <a:blip r:embed="rId4">
+            <a:extLst>
+              <a:ext uri="{28A0092B-C50C-407E-A947-70E740481C1C}">
+                <a14:useLocalDpi xmlns:a14="http://schemas.microsoft.com/office/drawing/2010/main" val="0"/>
+              </a:ext>
+            </a:extLst>
+          </a:blip>
+          <a:srcRect/>
+          <a:stretch>
+            <a:fillRect/>
+          </a:stretch>
+        </p:blipFill>
+        <p:spPr bwMode="auto">
           <a:xfrm>
-            <a:off x="6424097" y="1787116"/>
-            <a:ext cx="1998921" cy="3293209"/>
+            <a:off x="6060558" y="1227059"/>
+            <a:ext cx="5905500" cy="3933825"/>
           </a:xfrm>
           <a:prstGeom prst="rect">
             <a:avLst/>
           </a:prstGeom>
           <a:noFill/>
+          <a:extLst>
+            <a:ext uri="{909E8E84-426E-40DD-AFC4-6F175D3DCCD1}">
+              <a14:hiddenFill xmlns:a14="http://schemas.microsoft.com/office/drawing/2010/main">
+                <a:solidFill>
+                  <a:srgbClr val="FFFFFF"/>
+                </a:solidFill>
+              </a14:hiddenFill>
+            </a:ext>
+          </a:extLst>
         </p:spPr>
-        <p:txBody>
-          <a:bodyPr wrap="square" rtlCol="0">
-            <a:spAutoFit/>
-          </a:bodyPr>
-          <a:lstStyle/>
-          <a:p>
-            <a:r>
-              <a:rPr lang="en-US" sz="800" dirty="0"/>
-              <a:t>1. DC motor 1 "+" or stepper motor A+</a:t>
-            </a:r>
-          </a:p>
-          <a:p>
-            <a:r>
-              <a:rPr lang="en-US" sz="800" dirty="0"/>
-              <a:t>2. DC motor 1 "-" or stepper motor A-</a:t>
-            </a:r>
-          </a:p>
-          <a:p>
-            <a:r>
-              <a:rPr lang="en-US" sz="800" dirty="0"/>
-              <a:t>3. 12V jumper - remove this if using a supply voltage greater than 12V DC. This enables power to the onboard 5V regulator</a:t>
-            </a:r>
-          </a:p>
-          <a:p>
-            <a:r>
-              <a:rPr lang="en-US" sz="800" dirty="0"/>
-              <a:t>4. Connect your motor supply voltage here, maximum of 35V DC. Remove 12V jumper if &gt;12V DC</a:t>
-            </a:r>
-          </a:p>
-          <a:p>
-            <a:r>
-              <a:rPr lang="en-US" sz="800" dirty="0"/>
-              <a:t>5. GND</a:t>
-            </a:r>
-          </a:p>
-          <a:p>
-            <a:r>
-              <a:rPr lang="en-US" sz="800" dirty="0"/>
-              <a:t>6. 5V output if 12V jumper in place, ideal for powering your Arduino (</a:t>
-            </a:r>
-            <a:r>
-              <a:rPr lang="en-US" sz="800" dirty="0" err="1"/>
-              <a:t>etc</a:t>
-            </a:r>
-            <a:r>
-              <a:rPr lang="en-US" sz="800" dirty="0"/>
-              <a:t>)</a:t>
-            </a:r>
-          </a:p>
-          <a:p>
-            <a:r>
-              <a:rPr lang="en-US" sz="800" dirty="0"/>
-              <a:t>7. DC motor 1 enable jumper. Leave this in place when using a stepper motor. Connect to PWM output for DC motor speed control.</a:t>
-            </a:r>
-          </a:p>
-          <a:p>
-            <a:r>
-              <a:rPr lang="en-US" sz="800" dirty="0"/>
-              <a:t>8. IN1</a:t>
-            </a:r>
-          </a:p>
-          <a:p>
-            <a:r>
-              <a:rPr lang="en-US" sz="800" dirty="0"/>
-              <a:t>9. IN2</a:t>
-            </a:r>
-          </a:p>
-          <a:p>
-            <a:r>
-              <a:rPr lang="en-US" sz="800" dirty="0"/>
-              <a:t>10. IN3</a:t>
-            </a:r>
-          </a:p>
-          <a:p>
-            <a:r>
-              <a:rPr lang="en-US" sz="800" dirty="0"/>
-              <a:t>11. IN4</a:t>
-            </a:r>
-          </a:p>
-          <a:p>
-            <a:r>
-              <a:rPr lang="en-US" sz="800" dirty="0"/>
-              <a:t>12. DC motor 2 enable jumper. Leave this in place when using a stepper motor. Connect to PWM output for DC motor speed control.</a:t>
-            </a:r>
-          </a:p>
-          <a:p>
-            <a:r>
-              <a:rPr lang="en-US" sz="800" dirty="0"/>
-              <a:t>13. DC motor 2 "+" or stepper motor B+</a:t>
-            </a:r>
-          </a:p>
-          <a:p>
-            <a:r>
-              <a:rPr lang="en-US" sz="800" dirty="0"/>
-              <a:t>14. DC motor 2 "-" or stepper motor B-</a:t>
-            </a:r>
-          </a:p>
-          <a:p>
-            <a:endParaRPr lang="en-US" sz="800" dirty="0"/>
-          </a:p>
-        </p:txBody>
-      </p:sp>
+      </p:pic>
     </p:spTree>
     <p:extLst>
       <p:ext uri="{BB962C8B-B14F-4D97-AF65-F5344CB8AC3E}">

</xml_diff>